<commit_message>
Fixed Slight Clipping On Diagrams
</commit_message>
<xml_diff>
--- a/FINAL REPORT/CIS434 Project Presentation.pptx
+++ b/FINAL REPORT/CIS434 Project Presentation.pptx
@@ -12596,7 +12596,7 @@
         <p:spPr>
           <a:xfrm>
             <a:off x="4232635" y="3613666"/>
-            <a:ext cx="3242820" cy="1477328"/>
+            <a:ext cx="3242820" cy="2308324"/>
           </a:xfrm>
           <a:prstGeom prst="rect">
             <a:avLst/>
@@ -12631,6 +12631,15 @@
               <a:rPr lang="en-US" dirty="0"/>
               <a:t>+ Custom match setup</a:t>
             </a:r>
+          </a:p>
+          <a:p>
+            <a:r>
+              <a:rPr lang="en-US" dirty="0"/>
+              <a:t>+ Computer Turn Selection screen</a:t>
+            </a:r>
+          </a:p>
+          <a:p>
+            <a:endParaRPr lang="en-US" dirty="0"/>
           </a:p>
         </p:txBody>
       </p:sp>
@@ -12649,7 +12658,7 @@
         <p:spPr>
           <a:xfrm>
             <a:off x="7475455" y="3613666"/>
-            <a:ext cx="2507531" cy="1200329"/>
+            <a:ext cx="2599723" cy="1754326"/>
           </a:xfrm>
           <a:prstGeom prst="rect">
             <a:avLst/>
@@ -12664,14 +12673,17 @@
           <a:p>
             <a:r>
               <a:rPr lang="en-US" dirty="0"/>
-              <a:t>+ Computer given option to go first</a:t>
+              <a:t>+ Bugs addressed in computer turn selection</a:t>
             </a:r>
           </a:p>
           <a:p>
             <a:r>
               <a:rPr lang="en-US" dirty="0"/>
-              <a:t>+ Computer Turn Selection screen</a:t>
-            </a:r>
+              <a:t>+Smart AI move hierarchy established</a:t>
+            </a:r>
+          </a:p>
+          <a:p>
+            <a:endParaRPr lang="en-US" dirty="0"/>
           </a:p>
         </p:txBody>
       </p:sp>

</xml_diff>